<commit_message>
Updated with modifications on 08/01
</commit_message>
<xml_diff>
--- a/Presentation/Deliverables.pptx
+++ b/Presentation/Deliverables.pptx
@@ -8,12 +8,9 @@
     <p:sldId id="267" r:id="rId2"/>
     <p:sldId id="256" r:id="rId3"/>
     <p:sldId id="257" r:id="rId4"/>
-    <p:sldId id="262" r:id="rId5"/>
-    <p:sldId id="258" r:id="rId6"/>
+    <p:sldId id="258" r:id="rId5"/>
+    <p:sldId id="262" r:id="rId6"/>
     <p:sldId id="263" r:id="rId7"/>
-    <p:sldId id="264" r:id="rId8"/>
-    <p:sldId id="265" r:id="rId9"/>
-    <p:sldId id="266" r:id="rId10"/>
   </p:sldIdLst>
   <p:sldSz cx="12192000" cy="6858000"/>
   <p:notesSz cx="6858000" cy="9144000"/>
@@ -3520,7 +3517,7 @@
                   <a:schemeClr val="bg1"/>
                 </a:solidFill>
               </a:rPr>
-              <a:t>                (Dhana, Rajesh, Dave &amp; Asit)</a:t>
+              <a:t>                Dhana, Rajesh, Dave &amp; Asit</a:t>
             </a:r>
           </a:p>
         </p:txBody>
@@ -3936,7 +3933,7 @@
         <p:spPr>
           <a:xfrm>
             <a:off x="5763237" y="578840"/>
-            <a:ext cx="4275529" cy="2970044"/>
+            <a:ext cx="5178918" cy="3662541"/>
           </a:xfrm>
           <a:prstGeom prst="rect">
             <a:avLst/>
@@ -3958,16 +3955,25 @@
             </a:r>
           </a:p>
           <a:p>
+            <a:endParaRPr lang="en-US" sz="1500" dirty="0"/>
+          </a:p>
+          <a:p>
             <a:r>
               <a:rPr lang="en-US" sz="1500" dirty="0"/>
-              <a:t>Data Analysis done by - Dhana</a:t>
-            </a:r>
+              <a:t>Data Analysis and data clean up step derivation done by - Dhana</a:t>
+            </a:r>
+          </a:p>
+          <a:p>
+            <a:endParaRPr lang="en-US" sz="1500" dirty="0"/>
           </a:p>
           <a:p>
             <a:r>
               <a:rPr lang="en-US" sz="1500" dirty="0"/>
-              <a:t>Role Played - </a:t>
-            </a:r>
+              <a:t>Role Played - Circle</a:t>
+            </a:r>
+          </a:p>
+          <a:p>
+            <a:endParaRPr lang="en-US" sz="1500" dirty="0"/>
           </a:p>
           <a:p>
             <a:r>
@@ -5376,7 +5382,7 @@
         <p:spPr>
           <a:xfrm>
             <a:off x="7879936" y="968751"/>
-            <a:ext cx="4002314" cy="2123658"/>
+            <a:ext cx="4002314" cy="2585323"/>
           </a:xfrm>
           <a:prstGeom prst="rect">
             <a:avLst/>
@@ -5398,10 +5404,16 @@
             </a:r>
           </a:p>
           <a:p>
+            <a:endParaRPr lang="en-US" sz="1500" dirty="0"/>
+          </a:p>
+          <a:p>
             <a:r>
               <a:rPr lang="en-US" sz="1500" dirty="0"/>
-              <a:t>Role played - </a:t>
-            </a:r>
+              <a:t>Role played - X</a:t>
+            </a:r>
+          </a:p>
+          <a:p>
+            <a:endParaRPr lang="en-US" sz="1500" dirty="0"/>
           </a:p>
           <a:p>
             <a:r>
@@ -5467,8 +5479,8 @@
         </p:nvSpPr>
         <p:spPr>
           <a:xfrm>
-            <a:off x="93204" y="151629"/>
-            <a:ext cx="11631626" cy="234892"/>
+            <a:off x="0" y="75502"/>
+            <a:ext cx="11954312" cy="234892"/>
           </a:xfrm>
           <a:prstGeom prst="rect">
             <a:avLst/>
@@ -5497,6 +5509,191 @@
             <a:pPr algn="ctr"/>
             <a:r>
               <a:rPr lang="en-US" dirty="0"/>
+              <a:t>DB logical/physical design</a:t>
+            </a:r>
+          </a:p>
+        </p:txBody>
+      </p:sp>
+      <p:sp>
+        <p:nvSpPr>
+          <p:cNvPr id="3" name="TextBox 2">
+            <a:extLst>
+              <a:ext uri="{FF2B5EF4-FFF2-40B4-BE49-F238E27FC236}">
+                <a16:creationId xmlns:a16="http://schemas.microsoft.com/office/drawing/2014/main" id="{70ADDC52-B926-4AD9-B7AB-2E60D3109A6C}"/>
+              </a:ext>
+            </a:extLst>
+          </p:cNvPr>
+          <p:cNvSpPr txBox="1"/>
+          <p:nvPr/>
+        </p:nvSpPr>
+        <p:spPr>
+          <a:xfrm>
+            <a:off x="6973368" y="938636"/>
+            <a:ext cx="6097424" cy="2031325"/>
+          </a:xfrm>
+          <a:prstGeom prst="rect">
+            <a:avLst/>
+          </a:prstGeom>
+          <a:noFill/>
+        </p:spPr>
+        <p:txBody>
+          <a:bodyPr wrap="square">
+            <a:spAutoFit/>
+          </a:bodyPr>
+          <a:lstStyle/>
+          <a:p>
+            <a:r>
+              <a:rPr lang="en-US" sz="1800" dirty="0"/>
+              <a:t>DB design done by – Dave </a:t>
+            </a:r>
+          </a:p>
+          <a:p>
+            <a:endParaRPr lang="en-US" dirty="0"/>
+          </a:p>
+          <a:p>
+            <a:r>
+              <a:rPr lang="en-US" dirty="0"/>
+              <a:t>Role played - Circle</a:t>
+            </a:r>
+          </a:p>
+          <a:p>
+            <a:endParaRPr lang="en-US" dirty="0"/>
+          </a:p>
+          <a:p>
+            <a:r>
+              <a:rPr lang="en-US" sz="1800" dirty="0"/>
+              <a:t>GitHub URL- </a:t>
+            </a:r>
+          </a:p>
+          <a:p>
+            <a:endParaRPr lang="en-US" dirty="0"/>
+          </a:p>
+          <a:p>
+            <a:r>
+              <a:rPr lang="en-US" sz="1800" dirty="0">
+                <a:solidFill>
+                  <a:srgbClr val="FF0000"/>
+                </a:solidFill>
+              </a:rPr>
+              <a:t>XXXXX</a:t>
+            </a:r>
+            <a:r>
+              <a:rPr lang="en-US" sz="1800" dirty="0"/>
+              <a:t>	</a:t>
+            </a:r>
+          </a:p>
+        </p:txBody>
+      </p:sp>
+      <p:cxnSp>
+        <p:nvCxnSpPr>
+          <p:cNvPr id="5" name="Straight Connector 4">
+            <a:extLst>
+              <a:ext uri="{FF2B5EF4-FFF2-40B4-BE49-F238E27FC236}">
+                <a16:creationId xmlns:a16="http://schemas.microsoft.com/office/drawing/2014/main" id="{6FEC7301-F919-4CB6-83F8-68F068D698CA}"/>
+              </a:ext>
+            </a:extLst>
+          </p:cNvPr>
+          <p:cNvCxnSpPr/>
+          <p:nvPr/>
+        </p:nvCxnSpPr>
+        <p:spPr>
+          <a:xfrm>
+            <a:off x="6905002" y="377976"/>
+            <a:ext cx="68366" cy="5956419"/>
+          </a:xfrm>
+          <a:prstGeom prst="line">
+            <a:avLst/>
+          </a:prstGeom>
+        </p:spPr>
+        <p:style>
+          <a:lnRef idx="1">
+            <a:schemeClr val="accent1"/>
+          </a:lnRef>
+          <a:fillRef idx="0">
+            <a:schemeClr val="accent1"/>
+          </a:fillRef>
+          <a:effectRef idx="0">
+            <a:schemeClr val="accent1"/>
+          </a:effectRef>
+          <a:fontRef idx="minor">
+            <a:schemeClr val="tx1"/>
+          </a:fontRef>
+        </p:style>
+      </p:cxnSp>
+    </p:spTree>
+    <p:extLst>
+      <p:ext uri="{BB962C8B-B14F-4D97-AF65-F5344CB8AC3E}">
+        <p14:creationId xmlns:p14="http://schemas.microsoft.com/office/powerpoint/2010/main" val="1392023915"/>
+      </p:ext>
+    </p:extLst>
+  </p:cSld>
+  <p:clrMapOvr>
+    <a:masterClrMapping/>
+  </p:clrMapOvr>
+</p:sld>
+</file>
+
+<file path=ppt/slides/slide5.xml><?xml version="1.0" encoding="utf-8"?>
+<p:sld xmlns:a="http://schemas.openxmlformats.org/drawingml/2006/main" xmlns:r="http://schemas.openxmlformats.org/officeDocument/2006/relationships" xmlns:p="http://schemas.openxmlformats.org/presentationml/2006/main">
+  <p:cSld>
+    <p:spTree>
+      <p:nvGrpSpPr>
+        <p:cNvPr id="1" name=""/>
+        <p:cNvGrpSpPr/>
+        <p:nvPr/>
+      </p:nvGrpSpPr>
+      <p:grpSpPr>
+        <a:xfrm>
+          <a:off x="0" y="0"/>
+          <a:ext cx="0" cy="0"/>
+          <a:chOff x="0" y="0"/>
+          <a:chExt cx="0" cy="0"/>
+        </a:xfrm>
+      </p:grpSpPr>
+      <p:sp>
+        <p:nvSpPr>
+          <p:cNvPr id="4" name="Rectangle 3">
+            <a:extLst>
+              <a:ext uri="{FF2B5EF4-FFF2-40B4-BE49-F238E27FC236}">
+                <a16:creationId xmlns:a16="http://schemas.microsoft.com/office/drawing/2014/main" id="{50C9EFC4-C047-41E2-9DD1-6531A149FA45}"/>
+              </a:ext>
+            </a:extLst>
+          </p:cNvPr>
+          <p:cNvSpPr/>
+          <p:nvPr/>
+        </p:nvSpPr>
+        <p:spPr>
+          <a:xfrm>
+            <a:off x="93204" y="151629"/>
+            <a:ext cx="11631626" cy="234892"/>
+          </a:xfrm>
+          <a:prstGeom prst="rect">
+            <a:avLst/>
+          </a:prstGeom>
+        </p:spPr>
+        <p:style>
+          <a:lnRef idx="2">
+            <a:schemeClr val="accent2">
+              <a:shade val="50000"/>
+            </a:schemeClr>
+          </a:lnRef>
+          <a:fillRef idx="1">
+            <a:schemeClr val="accent2"/>
+          </a:fillRef>
+          <a:effectRef idx="0">
+            <a:schemeClr val="accent2"/>
+          </a:effectRef>
+          <a:fontRef idx="minor">
+            <a:schemeClr val="lt1"/>
+          </a:fontRef>
+        </p:style>
+        <p:txBody>
+          <a:bodyPr rtlCol="0" anchor="ctr"/>
+          <a:lstStyle/>
+          <a:p>
+            <a:pPr algn="ctr"/>
+            <a:r>
+              <a:rPr lang="en-US" dirty="0"/>
               <a:t>Analysis through M/C learning</a:t>
             </a:r>
           </a:p>
@@ -5517,14 +5714,14 @@
           <p:nvPr>
             <p:extLst>
               <p:ext uri="{D42A27DB-BD31-4B8C-83A1-F6EECF244321}">
-                <p14:modId xmlns:p14="http://schemas.microsoft.com/office/powerpoint/2010/main" val="3745342195"/>
+                <p14:modId xmlns:p14="http://schemas.microsoft.com/office/powerpoint/2010/main" val="781948452"/>
               </p:ext>
             </p:extLst>
           </p:nvPr>
         </p:nvGraphicFramePr>
         <p:xfrm>
           <a:off x="93204" y="888073"/>
-          <a:ext cx="6905802" cy="3982720"/>
+          <a:ext cx="6905802" cy="3754120"/>
         </p:xfrm>
         <a:graphic>
           <a:graphicData uri="http://schemas.openxmlformats.org/drawingml/2006/table">
@@ -5658,13 +5855,7 @@
                     <a:p>
                       <a:r>
                         <a:rPr lang="en-US" sz="1500" dirty="0"/>
-                        <a:t>A relatively new players want to predict </a:t>
-                      </a:r>
-                    </a:p>
-                    <a:p>
-                      <a:r>
-                        <a:rPr lang="en-US" sz="1500" dirty="0"/>
-                        <a:t>Whether his salary is going to increase, decrease or remains similar in next subsequent seasons based on his performance statistics in NBA.</a:t>
+                        <a:t>A relatively new players want to predict whether his salary is going to increase, decrease or remains similar in next subsequent seasons based on his performance statistics in NBA.</a:t>
                       </a:r>
                     </a:p>
                   </a:txBody>
@@ -5720,7 +5911,7 @@
         </p:nvCxnSpPr>
         <p:spPr>
           <a:xfrm>
-            <a:off x="7101555" y="450790"/>
+            <a:off x="7067372" y="386521"/>
             <a:ext cx="68366" cy="5956419"/>
           </a:xfrm>
           <a:prstGeom prst="line">
@@ -5756,8 +5947,8 @@
         </p:nvSpPr>
         <p:spPr>
           <a:xfrm>
-            <a:off x="7272470" y="888073"/>
-            <a:ext cx="6097424" cy="2031325"/>
+            <a:off x="7135738" y="964273"/>
+            <a:ext cx="6097424" cy="3416320"/>
           </a:xfrm>
           <a:prstGeom prst="rect">
             <a:avLst/>
@@ -5778,7 +5969,7 @@
           <a:p>
             <a:r>
               <a:rPr lang="en-US" dirty="0"/>
-              <a:t>(done only for Un-supervised learning)</a:t>
+              <a:t>(done only for requirement of Un-supervised learning)</a:t>
             </a:r>
             <a:br>
               <a:rPr lang="en-US" dirty="0"/>
@@ -5788,7 +5979,7 @@
             </a:br>
             <a:r>
               <a:rPr lang="en-US" dirty="0"/>
-              <a:t>Role played - </a:t>
+              <a:t>Role played - Triangle</a:t>
             </a:r>
           </a:p>
           <a:p>
@@ -5799,6 +5990,24 @@
               <a:rPr lang="en-US" sz="1800" dirty="0"/>
               <a:t>GitHub URL- </a:t>
             </a:r>
+          </a:p>
+          <a:p>
+            <a:endParaRPr lang="en-US" dirty="0"/>
+          </a:p>
+          <a:p>
+            <a:r>
+              <a:rPr lang="en-US" sz="1800" dirty="0">
+                <a:hlinkClick r:id="rId2"/>
+              </a:rPr>
+              <a:t>https://github.com/asitkumar26/nba-player-analytics/blob/main/ML-Models/player-clustering.ipynb</a:t>
+            </a:r>
+            <a:endParaRPr lang="en-US" sz="1800" dirty="0"/>
+          </a:p>
+          <a:p>
+            <a:endParaRPr lang="en-US" dirty="0"/>
+          </a:p>
+          <a:p>
+            <a:endParaRPr lang="en-US" sz="1800" dirty="0"/>
           </a:p>
           <a:p>
             <a:r>
@@ -5812,85 +6021,6 @@
     <p:extLst>
       <p:ext uri="{BB962C8B-B14F-4D97-AF65-F5344CB8AC3E}">
         <p14:creationId xmlns:p14="http://schemas.microsoft.com/office/powerpoint/2010/main" val="147242048"/>
-      </p:ext>
-    </p:extLst>
-  </p:cSld>
-  <p:clrMapOvr>
-    <a:masterClrMapping/>
-  </p:clrMapOvr>
-</p:sld>
-</file>
-
-<file path=ppt/slides/slide5.xml><?xml version="1.0" encoding="utf-8"?>
-<p:sld xmlns:a="http://schemas.openxmlformats.org/drawingml/2006/main" xmlns:r="http://schemas.openxmlformats.org/officeDocument/2006/relationships" xmlns:p="http://schemas.openxmlformats.org/presentationml/2006/main">
-  <p:cSld>
-    <p:spTree>
-      <p:nvGrpSpPr>
-        <p:cNvPr id="1" name=""/>
-        <p:cNvGrpSpPr/>
-        <p:nvPr/>
-      </p:nvGrpSpPr>
-      <p:grpSpPr>
-        <a:xfrm>
-          <a:off x="0" y="0"/>
-          <a:ext cx="0" cy="0"/>
-          <a:chOff x="0" y="0"/>
-          <a:chExt cx="0" cy="0"/>
-        </a:xfrm>
-      </p:grpSpPr>
-      <p:sp>
-        <p:nvSpPr>
-          <p:cNvPr id="4" name="Rectangle 3">
-            <a:extLst>
-              <a:ext uri="{FF2B5EF4-FFF2-40B4-BE49-F238E27FC236}">
-                <a16:creationId xmlns:a16="http://schemas.microsoft.com/office/drawing/2014/main" id="{50C9EFC4-C047-41E2-9DD1-6531A149FA45}"/>
-              </a:ext>
-            </a:extLst>
-          </p:cNvPr>
-          <p:cNvSpPr/>
-          <p:nvPr/>
-        </p:nvSpPr>
-        <p:spPr>
-          <a:xfrm>
-            <a:off x="0" y="75502"/>
-            <a:ext cx="11954312" cy="234892"/>
-          </a:xfrm>
-          <a:prstGeom prst="rect">
-            <a:avLst/>
-          </a:prstGeom>
-        </p:spPr>
-        <p:style>
-          <a:lnRef idx="2">
-            <a:schemeClr val="accent2">
-              <a:shade val="50000"/>
-            </a:schemeClr>
-          </a:lnRef>
-          <a:fillRef idx="1">
-            <a:schemeClr val="accent2"/>
-          </a:fillRef>
-          <a:effectRef idx="0">
-            <a:schemeClr val="accent2"/>
-          </a:effectRef>
-          <a:fontRef idx="minor">
-            <a:schemeClr val="lt1"/>
-          </a:fontRef>
-        </p:style>
-        <p:txBody>
-          <a:bodyPr rtlCol="0" anchor="ctr"/>
-          <a:lstStyle/>
-          <a:p>
-            <a:pPr algn="ctr"/>
-            <a:r>
-              <a:rPr lang="en-US" dirty="0"/>
-              <a:t>DB logical/physical design</a:t>
-            </a:r>
-          </a:p>
-        </p:txBody>
-      </p:sp>
-    </p:spTree>
-    <p:extLst>
-      <p:ext uri="{BB962C8B-B14F-4D97-AF65-F5344CB8AC3E}">
-        <p14:creationId xmlns:p14="http://schemas.microsoft.com/office/powerpoint/2010/main" val="1392023915"/>
       </p:ext>
     </p:extLst>
   </p:cSld>
@@ -6077,7 +6207,7 @@
         <p:spPr>
           <a:xfrm>
             <a:off x="7697755" y="1397675"/>
-            <a:ext cx="6097424" cy="1477328"/>
+            <a:ext cx="6097424" cy="1938992"/>
           </a:xfrm>
           <a:prstGeom prst="rect">
             <a:avLst/>
@@ -6101,7 +6231,7 @@
             </a:br>
             <a:r>
               <a:rPr lang="en-US" sz="1500" dirty="0"/>
-              <a:t>Role played - </a:t>
+              <a:t>Role played - Square</a:t>
             </a:r>
           </a:p>
           <a:p>
@@ -6116,8 +6246,21 @@
           <a:p>
             <a:r>
               <a:rPr lang="en-US" sz="1500" dirty="0"/>
-              <a:t>      https://github.com/asitkumar26/nba-player-analytics</a:t>
-            </a:r>
+              <a:t>      </a:t>
+            </a:r>
+            <a:r>
+              <a:rPr lang="en-US" sz="1500" dirty="0">
+                <a:hlinkClick r:id="rId4"/>
+              </a:rPr>
+              <a:t>https://github.com/asitkumar26/nba-player-analytics</a:t>
+            </a:r>
+            <a:endParaRPr lang="en-US" sz="1500" dirty="0"/>
+          </a:p>
+          <a:p>
+            <a:endParaRPr lang="en-US" sz="1500" dirty="0"/>
+          </a:p>
+          <a:p>
+            <a:endParaRPr lang="en-US" sz="1500" dirty="0"/>
           </a:p>
         </p:txBody>
       </p:sp>
@@ -6125,243 +6268,6 @@
     <p:extLst>
       <p:ext uri="{BB962C8B-B14F-4D97-AF65-F5344CB8AC3E}">
         <p14:creationId xmlns:p14="http://schemas.microsoft.com/office/powerpoint/2010/main" val="1065740104"/>
-      </p:ext>
-    </p:extLst>
-  </p:cSld>
-  <p:clrMapOvr>
-    <a:masterClrMapping/>
-  </p:clrMapOvr>
-</p:sld>
-</file>
-
-<file path=ppt/slides/slide7.xml><?xml version="1.0" encoding="utf-8"?>
-<p:sld xmlns:a="http://schemas.openxmlformats.org/drawingml/2006/main" xmlns:r="http://schemas.openxmlformats.org/officeDocument/2006/relationships" xmlns:p="http://schemas.openxmlformats.org/presentationml/2006/main">
-  <p:cSld>
-    <p:spTree>
-      <p:nvGrpSpPr>
-        <p:cNvPr id="1" name=""/>
-        <p:cNvGrpSpPr/>
-        <p:nvPr/>
-      </p:nvGrpSpPr>
-      <p:grpSpPr>
-        <a:xfrm>
-          <a:off x="0" y="0"/>
-          <a:ext cx="0" cy="0"/>
-          <a:chOff x="0" y="0"/>
-          <a:chExt cx="0" cy="0"/>
-        </a:xfrm>
-      </p:grpSpPr>
-      <p:sp>
-        <p:nvSpPr>
-          <p:cNvPr id="4" name="Rectangle 3">
-            <a:extLst>
-              <a:ext uri="{FF2B5EF4-FFF2-40B4-BE49-F238E27FC236}">
-                <a16:creationId xmlns:a16="http://schemas.microsoft.com/office/drawing/2014/main" id="{50C9EFC4-C047-41E2-9DD1-6531A149FA45}"/>
-              </a:ext>
-            </a:extLst>
-          </p:cNvPr>
-          <p:cNvSpPr/>
-          <p:nvPr/>
-        </p:nvSpPr>
-        <p:spPr>
-          <a:xfrm>
-            <a:off x="0" y="75502"/>
-            <a:ext cx="11954312" cy="234892"/>
-          </a:xfrm>
-          <a:prstGeom prst="rect">
-            <a:avLst/>
-          </a:prstGeom>
-        </p:spPr>
-        <p:style>
-          <a:lnRef idx="2">
-            <a:schemeClr val="accent2">
-              <a:shade val="50000"/>
-            </a:schemeClr>
-          </a:lnRef>
-          <a:fillRef idx="1">
-            <a:schemeClr val="accent2"/>
-          </a:fillRef>
-          <a:effectRef idx="0">
-            <a:schemeClr val="accent2"/>
-          </a:effectRef>
-          <a:fontRef idx="minor">
-            <a:schemeClr val="lt1"/>
-          </a:fontRef>
-        </p:style>
-        <p:txBody>
-          <a:bodyPr rtlCol="0" anchor="ctr"/>
-          <a:lstStyle/>
-          <a:p>
-            <a:pPr algn="ctr"/>
-            <a:r>
-              <a:rPr lang="en-US" dirty="0"/>
-              <a:t>Task Allocation – segment-2</a:t>
-            </a:r>
-          </a:p>
-        </p:txBody>
-      </p:sp>
-    </p:spTree>
-    <p:extLst>
-      <p:ext uri="{BB962C8B-B14F-4D97-AF65-F5344CB8AC3E}">
-        <p14:creationId xmlns:p14="http://schemas.microsoft.com/office/powerpoint/2010/main" val="2077548443"/>
-      </p:ext>
-    </p:extLst>
-  </p:cSld>
-  <p:clrMapOvr>
-    <a:masterClrMapping/>
-  </p:clrMapOvr>
-</p:sld>
-</file>
-
-<file path=ppt/slides/slide8.xml><?xml version="1.0" encoding="utf-8"?>
-<p:sld xmlns:a="http://schemas.openxmlformats.org/drawingml/2006/main" xmlns:r="http://schemas.openxmlformats.org/officeDocument/2006/relationships" xmlns:p="http://schemas.openxmlformats.org/presentationml/2006/main">
-  <p:cSld>
-    <p:spTree>
-      <p:nvGrpSpPr>
-        <p:cNvPr id="1" name=""/>
-        <p:cNvGrpSpPr/>
-        <p:nvPr/>
-      </p:nvGrpSpPr>
-      <p:grpSpPr>
-        <a:xfrm>
-          <a:off x="0" y="0"/>
-          <a:ext cx="0" cy="0"/>
-          <a:chOff x="0" y="0"/>
-          <a:chExt cx="0" cy="0"/>
-        </a:xfrm>
-      </p:grpSpPr>
-      <p:sp>
-        <p:nvSpPr>
-          <p:cNvPr id="4" name="Rectangle 3">
-            <a:extLst>
-              <a:ext uri="{FF2B5EF4-FFF2-40B4-BE49-F238E27FC236}">
-                <a16:creationId xmlns:a16="http://schemas.microsoft.com/office/drawing/2014/main" id="{50C9EFC4-C047-41E2-9DD1-6531A149FA45}"/>
-              </a:ext>
-            </a:extLst>
-          </p:cNvPr>
-          <p:cNvSpPr/>
-          <p:nvPr/>
-        </p:nvSpPr>
-        <p:spPr>
-          <a:xfrm>
-            <a:off x="0" y="75502"/>
-            <a:ext cx="11954312" cy="234892"/>
-          </a:xfrm>
-          <a:prstGeom prst="rect">
-            <a:avLst/>
-          </a:prstGeom>
-        </p:spPr>
-        <p:style>
-          <a:lnRef idx="2">
-            <a:schemeClr val="accent2">
-              <a:shade val="50000"/>
-            </a:schemeClr>
-          </a:lnRef>
-          <a:fillRef idx="1">
-            <a:schemeClr val="accent2"/>
-          </a:fillRef>
-          <a:effectRef idx="0">
-            <a:schemeClr val="accent2"/>
-          </a:effectRef>
-          <a:fontRef idx="minor">
-            <a:schemeClr val="lt1"/>
-          </a:fontRef>
-        </p:style>
-        <p:txBody>
-          <a:bodyPr rtlCol="0" anchor="ctr"/>
-          <a:lstStyle/>
-          <a:p>
-            <a:pPr algn="ctr"/>
-            <a:r>
-              <a:rPr lang="en-US" dirty="0"/>
-              <a:t>Task Allocation – segment-3</a:t>
-            </a:r>
-          </a:p>
-        </p:txBody>
-      </p:sp>
-    </p:spTree>
-    <p:extLst>
-      <p:ext uri="{BB962C8B-B14F-4D97-AF65-F5344CB8AC3E}">
-        <p14:creationId xmlns:p14="http://schemas.microsoft.com/office/powerpoint/2010/main" val="4216128763"/>
-      </p:ext>
-    </p:extLst>
-  </p:cSld>
-  <p:clrMapOvr>
-    <a:masterClrMapping/>
-  </p:clrMapOvr>
-</p:sld>
-</file>
-
-<file path=ppt/slides/slide9.xml><?xml version="1.0" encoding="utf-8"?>
-<p:sld xmlns:a="http://schemas.openxmlformats.org/drawingml/2006/main" xmlns:r="http://schemas.openxmlformats.org/officeDocument/2006/relationships" xmlns:p="http://schemas.openxmlformats.org/presentationml/2006/main">
-  <p:cSld>
-    <p:spTree>
-      <p:nvGrpSpPr>
-        <p:cNvPr id="1" name=""/>
-        <p:cNvGrpSpPr/>
-        <p:nvPr/>
-      </p:nvGrpSpPr>
-      <p:grpSpPr>
-        <a:xfrm>
-          <a:off x="0" y="0"/>
-          <a:ext cx="0" cy="0"/>
-          <a:chOff x="0" y="0"/>
-          <a:chExt cx="0" cy="0"/>
-        </a:xfrm>
-      </p:grpSpPr>
-      <p:sp>
-        <p:nvSpPr>
-          <p:cNvPr id="4" name="Rectangle 3">
-            <a:extLst>
-              <a:ext uri="{FF2B5EF4-FFF2-40B4-BE49-F238E27FC236}">
-                <a16:creationId xmlns:a16="http://schemas.microsoft.com/office/drawing/2014/main" id="{50C9EFC4-C047-41E2-9DD1-6531A149FA45}"/>
-              </a:ext>
-            </a:extLst>
-          </p:cNvPr>
-          <p:cNvSpPr/>
-          <p:nvPr/>
-        </p:nvSpPr>
-        <p:spPr>
-          <a:xfrm>
-            <a:off x="0" y="75502"/>
-            <a:ext cx="11954312" cy="234892"/>
-          </a:xfrm>
-          <a:prstGeom prst="rect">
-            <a:avLst/>
-          </a:prstGeom>
-        </p:spPr>
-        <p:style>
-          <a:lnRef idx="2">
-            <a:schemeClr val="accent2">
-              <a:shade val="50000"/>
-            </a:schemeClr>
-          </a:lnRef>
-          <a:fillRef idx="1">
-            <a:schemeClr val="accent2"/>
-          </a:fillRef>
-          <a:effectRef idx="0">
-            <a:schemeClr val="accent2"/>
-          </a:effectRef>
-          <a:fontRef idx="minor">
-            <a:schemeClr val="lt1"/>
-          </a:fontRef>
-        </p:style>
-        <p:txBody>
-          <a:bodyPr rtlCol="0" anchor="ctr"/>
-          <a:lstStyle/>
-          <a:p>
-            <a:pPr algn="ctr"/>
-            <a:r>
-              <a:rPr lang="en-US" dirty="0"/>
-              <a:t>Task Allocation – segment-4</a:t>
-            </a:r>
-          </a:p>
-        </p:txBody>
-      </p:sp>
-    </p:spTree>
-    <p:extLst>
-      <p:ext uri="{BB962C8B-B14F-4D97-AF65-F5344CB8AC3E}">
-        <p14:creationId xmlns:p14="http://schemas.microsoft.com/office/powerpoint/2010/main" val="1802704647"/>
       </p:ext>
     </p:extLst>
   </p:cSld>

</xml_diff>

<commit_message>
Uploading with presentation updates on 09/01
</commit_message>
<xml_diff>
--- a/Presentation/Deliverables.pptx
+++ b/Presentation/Deliverables.pptx
@@ -3497,7 +3497,7 @@
                   <a:schemeClr val="bg1"/>
                 </a:solidFill>
               </a:rPr>
-              <a:t>Group Name - DNA Champs</a:t>
+              <a:t>Group Name – D&amp;A Champs</a:t>
             </a:r>
           </a:p>
           <a:p>
@@ -3933,7 +3933,7 @@
         <p:spPr>
           <a:xfrm>
             <a:off x="5763237" y="578840"/>
-            <a:ext cx="5178918" cy="3662541"/>
+            <a:ext cx="5178918" cy="4278094"/>
           </a:xfrm>
           <a:prstGeom prst="rect">
             <a:avLst/>
@@ -4007,6 +4007,28 @@
               </a:rPr>
               <a:t>https://github.com/asitkumar26/nba-player-analytics/tree/main/Resources</a:t>
             </a:r>
+            <a:endParaRPr lang="en-US" sz="1000" dirty="0"/>
+          </a:p>
+          <a:p>
+            <a:endParaRPr lang="en-US" sz="1000" dirty="0"/>
+          </a:p>
+          <a:p>
+            <a:r>
+              <a:rPr lang="en-US" sz="1000" dirty="0"/>
+              <a:t>    </a:t>
+            </a:r>
+            <a:r>
+              <a:rPr lang="en-US" sz="1000" dirty="0">
+                <a:hlinkClick r:id="rId3"/>
+              </a:rPr>
+              <a:t>https://github.com/asitkumar26/nba-player-analytics/blob/main/Presentation/ETLSteps.xlsx</a:t>
+            </a:r>
+            <a:endParaRPr lang="en-US" sz="1000" dirty="0"/>
+          </a:p>
+          <a:p>
+            <a:endParaRPr lang="en-US" sz="1000" dirty="0"/>
+          </a:p>
+          <a:p>
             <a:endParaRPr lang="en-US" sz="1000" dirty="0"/>
           </a:p>
           <a:p>
@@ -5620,6 +5642,36 @@
           </a:fontRef>
         </p:style>
       </p:cxnSp>
+      <p:pic>
+        <p:nvPicPr>
+          <p:cNvPr id="6" name="Picture 5">
+            <a:extLst>
+              <a:ext uri="{FF2B5EF4-FFF2-40B4-BE49-F238E27FC236}">
+                <a16:creationId xmlns:a16="http://schemas.microsoft.com/office/drawing/2014/main" id="{3E27862A-8D0D-40DB-9D9E-919C222AE686}"/>
+              </a:ext>
+            </a:extLst>
+          </p:cNvPr>
+          <p:cNvPicPr>
+            <a:picLocks noChangeAspect="1"/>
+          </p:cNvPicPr>
+          <p:nvPr/>
+        </p:nvPicPr>
+        <p:blipFill>
+          <a:blip r:embed="rId2"/>
+          <a:stretch>
+            <a:fillRect/>
+          </a:stretch>
+        </p:blipFill>
+        <p:spPr>
+          <a:xfrm>
+            <a:off x="752475" y="4019820"/>
+            <a:ext cx="6025830" cy="2314575"/>
+          </a:xfrm>
+          <a:prstGeom prst="rect">
+            <a:avLst/>
+          </a:prstGeom>
+        </p:spPr>
+      </p:pic>
     </p:spTree>
     <p:extLst>
       <p:ext uri="{BB962C8B-B14F-4D97-AF65-F5344CB8AC3E}">

</xml_diff>